<commit_message>
Update to clean architecture
</commit_message>
<xml_diff>
--- a/Clean Architecture/Clean Architecture.pptx
+++ b/Clean Architecture/Clean Architecture.pptx
@@ -236,7 +236,7 @@
           <a:p>
             <a:fld id="{F289937F-3EA1-4C08-815E-C1EEE7294C53}" type="datetimeFigureOut">
               <a:rPr lang="en-GB" smtClean="0"/>
-              <a:t>24/11/2021</a:t>
+              <a:t>09/12/2021</a:t>
             </a:fld>
             <a:endParaRPr lang="en-GB"/>
           </a:p>
@@ -3427,7 +3427,7 @@
           <a:p>
             <a:fld id="{352E5E25-78BA-404C-BDF6-82AB5E250D74}" type="datetimeFigureOut">
               <a:rPr lang="en-GB" smtClean="0"/>
-              <a:t>24/11/2021</a:t>
+              <a:t>09/12/2021</a:t>
             </a:fld>
             <a:endParaRPr lang="en-GB"/>
           </a:p>
@@ -3627,7 +3627,7 @@
           <a:p>
             <a:fld id="{352E5E25-78BA-404C-BDF6-82AB5E250D74}" type="datetimeFigureOut">
               <a:rPr lang="en-GB" smtClean="0"/>
-              <a:t>24/11/2021</a:t>
+              <a:t>09/12/2021</a:t>
             </a:fld>
             <a:endParaRPr lang="en-GB"/>
           </a:p>
@@ -3837,7 +3837,7 @@
           <a:p>
             <a:fld id="{352E5E25-78BA-404C-BDF6-82AB5E250D74}" type="datetimeFigureOut">
               <a:rPr lang="en-GB" smtClean="0"/>
-              <a:t>24/11/2021</a:t>
+              <a:t>09/12/2021</a:t>
             </a:fld>
             <a:endParaRPr lang="en-GB"/>
           </a:p>
@@ -4037,7 +4037,7 @@
           <a:p>
             <a:fld id="{352E5E25-78BA-404C-BDF6-82AB5E250D74}" type="datetimeFigureOut">
               <a:rPr lang="en-GB" smtClean="0"/>
-              <a:t>24/11/2021</a:t>
+              <a:t>09/12/2021</a:t>
             </a:fld>
             <a:endParaRPr lang="en-GB"/>
           </a:p>
@@ -4313,7 +4313,7 @@
           <a:p>
             <a:fld id="{352E5E25-78BA-404C-BDF6-82AB5E250D74}" type="datetimeFigureOut">
               <a:rPr lang="en-GB" smtClean="0"/>
-              <a:t>24/11/2021</a:t>
+              <a:t>09/12/2021</a:t>
             </a:fld>
             <a:endParaRPr lang="en-GB"/>
           </a:p>
@@ -4581,7 +4581,7 @@
           <a:p>
             <a:fld id="{352E5E25-78BA-404C-BDF6-82AB5E250D74}" type="datetimeFigureOut">
               <a:rPr lang="en-GB" smtClean="0"/>
-              <a:t>24/11/2021</a:t>
+              <a:t>09/12/2021</a:t>
             </a:fld>
             <a:endParaRPr lang="en-GB"/>
           </a:p>
@@ -4996,7 +4996,7 @@
           <a:p>
             <a:fld id="{352E5E25-78BA-404C-BDF6-82AB5E250D74}" type="datetimeFigureOut">
               <a:rPr lang="en-GB" smtClean="0"/>
-              <a:t>24/11/2021</a:t>
+              <a:t>09/12/2021</a:t>
             </a:fld>
             <a:endParaRPr lang="en-GB"/>
           </a:p>
@@ -5138,7 +5138,7 @@
           <a:p>
             <a:fld id="{352E5E25-78BA-404C-BDF6-82AB5E250D74}" type="datetimeFigureOut">
               <a:rPr lang="en-GB" smtClean="0"/>
-              <a:t>24/11/2021</a:t>
+              <a:t>09/12/2021</a:t>
             </a:fld>
             <a:endParaRPr lang="en-GB"/>
           </a:p>
@@ -5251,7 +5251,7 @@
           <a:p>
             <a:fld id="{352E5E25-78BA-404C-BDF6-82AB5E250D74}" type="datetimeFigureOut">
               <a:rPr lang="en-GB" smtClean="0"/>
-              <a:t>24/11/2021</a:t>
+              <a:t>09/12/2021</a:t>
             </a:fld>
             <a:endParaRPr lang="en-GB"/>
           </a:p>
@@ -5564,7 +5564,7 @@
           <a:p>
             <a:fld id="{352E5E25-78BA-404C-BDF6-82AB5E250D74}" type="datetimeFigureOut">
               <a:rPr lang="en-GB" smtClean="0"/>
-              <a:t>24/11/2021</a:t>
+              <a:t>09/12/2021</a:t>
             </a:fld>
             <a:endParaRPr lang="en-GB"/>
           </a:p>
@@ -5853,7 +5853,7 @@
           <a:p>
             <a:fld id="{352E5E25-78BA-404C-BDF6-82AB5E250D74}" type="datetimeFigureOut">
               <a:rPr lang="en-GB" smtClean="0"/>
-              <a:t>24/11/2021</a:t>
+              <a:t>09/12/2021</a:t>
             </a:fld>
             <a:endParaRPr lang="en-GB"/>
           </a:p>
@@ -6096,7 +6096,7 @@
           <a:p>
             <a:fld id="{352E5E25-78BA-404C-BDF6-82AB5E250D74}" type="datetimeFigureOut">
               <a:rPr lang="en-GB" smtClean="0"/>
-              <a:t>24/11/2021</a:t>
+              <a:t>09/12/2021</a:t>
             </a:fld>
             <a:endParaRPr lang="en-GB"/>
           </a:p>
@@ -9233,19 +9233,19 @@
           <a:p>
             <a:r>
               <a:rPr lang="en-US" dirty="0"/>
-              <a:t>Problems that we can solve</a:t>
-            </a:r>
-          </a:p>
-          <a:p>
-            <a:r>
-              <a:rPr lang="en-US" dirty="0"/>
-              <a:t>What does clean architecture pair well with</a:t>
-            </a:r>
-          </a:p>
-          <a:p>
-            <a:r>
-              <a:rPr lang="en-US" dirty="0"/>
-              <a:t>Implement it</a:t>
+              <a:t>Problems with some layered system and how to solve them</a:t>
+            </a:r>
+          </a:p>
+          <a:p>
+            <a:r>
+              <a:rPr lang="en-US" dirty="0"/>
+              <a:t>What practices does clean architecture pair well with</a:t>
+            </a:r>
+          </a:p>
+          <a:p>
+            <a:r>
+              <a:rPr lang="en-US" dirty="0"/>
+              <a:t>Building your own best practice</a:t>
             </a:r>
           </a:p>
         </p:txBody>

</xml_diff>